<commit_message>
added visual, convert to PDF
</commit_message>
<xml_diff>
--- a/Lab 1.pptx
+++ b/Lab 1.pptx
@@ -7,8 +7,8 @@
   <p:sldIdLst>
     <p:sldId id="256" r:id="rId2"/>
     <p:sldId id="257" r:id="rId3"/>
-    <p:sldId id="258" r:id="rId4"/>
-    <p:sldId id="259" r:id="rId5"/>
+    <p:sldId id="259" r:id="rId4"/>
+    <p:sldId id="258" r:id="rId5"/>
     <p:sldId id="260" r:id="rId6"/>
   </p:sldIdLst>
   <p:sldSz cx="12192000" cy="6858000"/>
@@ -272,7 +272,7 @@
           <a:p>
             <a:fld id="{098A0168-EB40-45AF-89A1-87DE0A55FFC6}" type="datetime1">
               <a:rPr lang="en-US" smtClean="0"/>
-              <a:t>1/21/21</a:t>
+              <a:t>1/21/2021</a:t>
             </a:fld>
             <a:endParaRPr lang="en-US"/>
           </a:p>
@@ -523,7 +523,7 @@
           <a:p>
             <a:fld id="{8F8CA68F-747D-436A-B5BB-2EBC3ED499E4}" type="datetime1">
               <a:rPr lang="en-US" smtClean="0"/>
-              <a:t>1/21/21</a:t>
+              <a:t>1/21/2021</a:t>
             </a:fld>
             <a:endParaRPr lang="en-US"/>
           </a:p>
@@ -733,7 +733,7 @@
           <a:p>
             <a:fld id="{6DD8DC11-9E39-40A0-B3DC-E3F2AD04A616}" type="datetime1">
               <a:rPr lang="en-US" smtClean="0"/>
-              <a:t>1/21/21</a:t>
+              <a:t>1/21/2021</a:t>
             </a:fld>
             <a:endParaRPr lang="en-US"/>
           </a:p>
@@ -943,7 +943,7 @@
           <a:p>
             <a:fld id="{BE0A88F0-556B-4BB7-8AAB-D63AEB65C662}" type="datetime1">
               <a:rPr lang="en-US" smtClean="0"/>
-              <a:t>1/21/21</a:t>
+              <a:t>1/21/2021</a:t>
             </a:fld>
             <a:endParaRPr lang="en-US"/>
           </a:p>
@@ -1260,7 +1260,7 @@
           <a:p>
             <a:fld id="{60E05506-6815-4E0E-B1DE-ECA35C2016DF}" type="datetime1">
               <a:rPr lang="en-US" smtClean="0"/>
-              <a:t>1/21/21</a:t>
+              <a:t>1/21/2021</a:t>
             </a:fld>
             <a:endParaRPr lang="en-US"/>
           </a:p>
@@ -1533,7 +1533,7 @@
           <a:p>
             <a:fld id="{FC6E85F7-A724-48A4-9D33-CEBC5174E865}" type="datetime1">
               <a:rPr lang="en-US" smtClean="0"/>
-              <a:t>1/21/21</a:t>
+              <a:t>1/21/2021</a:t>
             </a:fld>
             <a:endParaRPr lang="en-US"/>
           </a:p>
@@ -2044,7 +2044,7 @@
           <a:p>
             <a:fld id="{42806E7A-BDD3-46A3-BEE2-EB821F9236B4}" type="datetime1">
               <a:rPr lang="en-US" smtClean="0"/>
-              <a:t>1/21/21</a:t>
+              <a:t>1/21/2021</a:t>
             </a:fld>
             <a:endParaRPr lang="en-US"/>
           </a:p>
@@ -2277,7 +2277,7 @@
           <a:p>
             <a:fld id="{9ED1540C-9440-4E7A-B71A-BEFEE06869E3}" type="datetime1">
               <a:rPr lang="en-US" smtClean="0"/>
-              <a:t>1/21/21</a:t>
+              <a:t>1/21/2021</a:t>
             </a:fld>
             <a:endParaRPr lang="en-US"/>
           </a:p>
@@ -2390,7 +2390,7 @@
           <a:p>
             <a:fld id="{E0318DDB-88AC-4039-B59C-B05DC4C9C16C}" type="datetime1">
               <a:rPr lang="en-US" smtClean="0"/>
-              <a:t>1/21/21</a:t>
+              <a:t>1/21/2021</a:t>
             </a:fld>
             <a:endParaRPr lang="en-US"/>
           </a:p>
@@ -2705,7 +2705,7 @@
           <a:p>
             <a:fld id="{E082ABFB-60E7-4BA1-866A-7059F058065B}" type="datetime1">
               <a:rPr lang="en-US" smtClean="0"/>
-              <a:t>1/21/21</a:t>
+              <a:t>1/21/2021</a:t>
             </a:fld>
             <a:endParaRPr lang="en-US"/>
           </a:p>
@@ -2997,7 +2997,7 @@
           <a:p>
             <a:fld id="{2694112F-55F4-4776-A323-7418930321C8}" type="datetime1">
               <a:rPr lang="en-US" smtClean="0"/>
-              <a:t>1/21/21</a:t>
+              <a:t>1/21/2021</a:t>
             </a:fld>
             <a:endParaRPr lang="en-US"/>
           </a:p>
@@ -3292,7 +3292,7 @@
           <a:p>
             <a:fld id="{CFBEA57F-793F-4683-BD8A-741FD4B89154}" type="datetime1">
               <a:rPr lang="en-US" smtClean="0"/>
-              <a:t>1/21/21</a:t>
+              <a:t>1/21/2021</a:t>
             </a:fld>
             <a:endParaRPr lang="en-US" dirty="0"/>
           </a:p>
@@ -4611,7 +4611,7 @@
           <a:p>
             <a:fld id="{BE0A88F0-556B-4BB7-8AAB-D63AEB65C662}" type="datetime1">
               <a:rPr lang="en-US" smtClean="0"/>
-              <a:t>1/21/21</a:t>
+              <a:t>1/21/2021</a:t>
             </a:fld>
             <a:endParaRPr lang="en-US" dirty="0"/>
           </a:p>
@@ -4692,42 +4692,19 @@
             <p:ph type="title"/>
           </p:nvPr>
         </p:nvSpPr>
-        <p:spPr/>
+        <p:spPr>
+          <a:xfrm>
+            <a:off x="838199" y="545914"/>
+            <a:ext cx="9527275" cy="673286"/>
+          </a:xfrm>
+        </p:spPr>
         <p:txBody>
           <a:bodyPr/>
           <a:lstStyle/>
           <a:p>
             <a:r>
               <a:rPr lang="en-US" dirty="0"/>
-              <a:t>Link</a:t>
-            </a:r>
-          </a:p>
-        </p:txBody>
-      </p:sp>
-      <p:sp>
-        <p:nvSpPr>
-          <p:cNvPr id="3" name="Content Placeholder 2">
-            <a:extLst>
-              <a:ext uri="{FF2B5EF4-FFF2-40B4-BE49-F238E27FC236}">
-                <a16:creationId xmlns:a16="http://schemas.microsoft.com/office/drawing/2014/main" id="{E50B140C-26A4-4722-93E4-7A261A048263}"/>
-              </a:ext>
-            </a:extLst>
-          </p:cNvPr>
-          <p:cNvSpPr>
-            <a:spLocks noGrp="1"/>
-          </p:cNvSpPr>
-          <p:nvPr>
-            <p:ph idx="1"/>
-          </p:nvPr>
-        </p:nvSpPr>
-        <p:spPr/>
-        <p:txBody>
-          <a:bodyPr/>
-          <a:lstStyle/>
-          <a:p>
-            <a:r>
-              <a:rPr lang="en-US" dirty="0"/>
-              <a:t>https://github.com/Inceptix/CIS-4496-Project1</a:t>
+              <a:t>Visualization</a:t>
             </a:r>
           </a:p>
         </p:txBody>
@@ -4755,7 +4732,7 @@
           <a:p>
             <a:fld id="{BE0A88F0-556B-4BB7-8AAB-D63AEB65C662}" type="datetime1">
               <a:rPr lang="en-US" smtClean="0"/>
-              <a:t>1/21/21</a:t>
+              <a:t>1/21/2021</a:t>
             </a:fld>
             <a:endParaRPr lang="en-US" dirty="0"/>
           </a:p>
@@ -4790,10 +4767,97 @@
           </a:p>
         </p:txBody>
       </p:sp>
+      <p:pic>
+        <p:nvPicPr>
+          <p:cNvPr id="11" name="Content Placeholder 10" descr="A screen shot of a game&#10;&#10;Description automatically generated with low confidence">
+            <a:extLst>
+              <a:ext uri="{FF2B5EF4-FFF2-40B4-BE49-F238E27FC236}">
+                <a16:creationId xmlns:a16="http://schemas.microsoft.com/office/drawing/2014/main" id="{95CA074D-4DA1-4EBF-849E-3C5B88B11A08}"/>
+              </a:ext>
+            </a:extLst>
+          </p:cNvPr>
+          <p:cNvPicPr>
+            <a:picLocks noGrp="1" noChangeAspect="1"/>
+          </p:cNvPicPr>
+          <p:nvPr>
+            <p:ph idx="1"/>
+          </p:nvPr>
+        </p:nvPicPr>
+        <p:blipFill>
+          <a:blip r:embed="rId2">
+            <a:extLst>
+              <a:ext uri="{28A0092B-C50C-407E-A947-70E740481C1C}">
+                <a14:useLocalDpi xmlns:a14="http://schemas.microsoft.com/office/drawing/2010/main" val="0"/>
+              </a:ext>
+            </a:extLst>
+          </a:blip>
+          <a:stretch>
+            <a:fillRect/>
+          </a:stretch>
+        </p:blipFill>
+        <p:spPr>
+          <a:xfrm>
+            <a:off x="0" y="1219200"/>
+            <a:ext cx="6177947" cy="5638800"/>
+          </a:xfrm>
+        </p:spPr>
+      </p:pic>
+      <p:sp>
+        <p:nvSpPr>
+          <p:cNvPr id="12" name="TextBox 11">
+            <a:extLst>
+              <a:ext uri="{FF2B5EF4-FFF2-40B4-BE49-F238E27FC236}">
+                <a16:creationId xmlns:a16="http://schemas.microsoft.com/office/drawing/2014/main" id="{512C0F9C-D2AB-47A1-A2D4-24A073C86726}"/>
+              </a:ext>
+            </a:extLst>
+          </p:cNvPr>
+          <p:cNvSpPr txBox="1"/>
+          <p:nvPr/>
+        </p:nvSpPr>
+        <p:spPr>
+          <a:xfrm>
+            <a:off x="6362059" y="1875307"/>
+            <a:ext cx="4275529" cy="923330"/>
+          </a:xfrm>
+          <a:prstGeom prst="rect">
+            <a:avLst/>
+          </a:prstGeom>
+          <a:noFill/>
+        </p:spPr>
+        <p:txBody>
+          <a:bodyPr wrap="none" rtlCol="0">
+            <a:spAutoFit/>
+          </a:bodyPr>
+          <a:lstStyle/>
+          <a:p>
+            <a:r>
+              <a:rPr lang="en-US" dirty="0"/>
+              <a:t>Correlation heatmap showing which of the</a:t>
+            </a:r>
+          </a:p>
+          <a:p>
+            <a:r>
+              <a:rPr lang="en-US" dirty="0"/>
+              <a:t>features are more correlated to </a:t>
+            </a:r>
+            <a:r>
+              <a:rPr lang="en-US" dirty="0" err="1"/>
+              <a:t>fetal_health</a:t>
+            </a:r>
+            <a:endParaRPr lang="en-US" dirty="0"/>
+          </a:p>
+          <a:p>
+            <a:r>
+              <a:rPr lang="en-US" dirty="0"/>
+              <a:t>at the bottom.</a:t>
+            </a:r>
+          </a:p>
+        </p:txBody>
+      </p:sp>
     </p:spTree>
     <p:extLst>
       <p:ext uri="{BB962C8B-B14F-4D97-AF65-F5344CB8AC3E}">
-        <p14:creationId xmlns:p14="http://schemas.microsoft.com/office/powerpoint/2010/main" val="3789403662"/>
+        <p14:creationId xmlns:p14="http://schemas.microsoft.com/office/powerpoint/2010/main" val="3887098449"/>
       </p:ext>
     </p:extLst>
   </p:cSld>
@@ -4843,7 +4907,7 @@
           <a:p>
             <a:r>
               <a:rPr lang="en-US" dirty="0"/>
-              <a:t>Visualization</a:t>
+              <a:t>Link</a:t>
             </a:r>
           </a:p>
         </p:txBody>
@@ -4869,7 +4933,10 @@
           <a:bodyPr/>
           <a:lstStyle/>
           <a:p>
-            <a:endParaRPr lang="en-US" dirty="0"/>
+            <a:r>
+              <a:rPr lang="en-US" dirty="0"/>
+              <a:t>https://github.com/Inceptix/CIS-4496-Project1</a:t>
+            </a:r>
           </a:p>
         </p:txBody>
       </p:sp>
@@ -4896,7 +4963,7 @@
           <a:p>
             <a:fld id="{BE0A88F0-556B-4BB7-8AAB-D63AEB65C662}" type="datetime1">
               <a:rPr lang="en-US" smtClean="0"/>
-              <a:t>1/21/21</a:t>
+              <a:t>1/21/2021</a:t>
             </a:fld>
             <a:endParaRPr lang="en-US" dirty="0"/>
           </a:p>
@@ -4934,7 +5001,7 @@
     </p:spTree>
     <p:extLst>
       <p:ext uri="{BB962C8B-B14F-4D97-AF65-F5344CB8AC3E}">
-        <p14:creationId xmlns:p14="http://schemas.microsoft.com/office/powerpoint/2010/main" val="3887098449"/>
+        <p14:creationId xmlns:p14="http://schemas.microsoft.com/office/powerpoint/2010/main" val="3789403662"/>
       </p:ext>
     </p:extLst>
   </p:cSld>
@@ -5058,7 +5125,7 @@
           <a:p>
             <a:fld id="{BE0A88F0-556B-4BB7-8AAB-D63AEB65C662}" type="datetime1">
               <a:rPr lang="en-US" smtClean="0"/>
-              <a:t>1/21/21</a:t>
+              <a:t>1/21/2021</a:t>
             </a:fld>
             <a:endParaRPr lang="en-US" dirty="0"/>
           </a:p>

</xml_diff>